<commit_message>
Add title and intro slide
</commit_message>
<xml_diff>
--- a/Midterm_Presentation.pptx
+++ b/Midterm_Presentation.pptx
@@ -6,6 +6,8 @@
   </p:sldMasterIdLst>
   <p:sldIdLst>
     <p:sldId id="256" r:id="rId2"/>
+    <p:sldId id="257" r:id="rId3"/>
+    <p:sldId id="258" r:id="rId4"/>
   </p:sldIdLst>
   <p:sldSz cx="12192000" cy="6858000"/>
   <p:notesSz cx="6858000" cy="9144000"/>
@@ -2964,41 +2966,407 @@
           <a:chExt cx="0" cy="0"/>
         </a:xfrm>
       </p:grpSpPr>
-      <p:sp>
-        <p:nvSpPr>
-          <p:cNvPr id="2" name="Title 1"/>
-          <p:cNvSpPr>
-            <a:spLocks noGrp="1"/>
+      <p:graphicFrame>
+        <p:nvGraphicFramePr>
+          <p:cNvPr id="4" name="Table 3"/>
+          <p:cNvGraphicFramePr>
+            <a:graphicFrameLocks noGrp="1"/>
+          </p:cNvGraphicFramePr>
+          <p:nvPr>
+            <p:extLst>
+              <p:ext uri="{D42A27DB-BD31-4B8C-83A1-F6EECF244321}">
+                <p14:modId xmlns:p14="http://schemas.microsoft.com/office/powerpoint/2010/main" val="660296826"/>
+              </p:ext>
+            </p:extLst>
+          </p:nvPr>
+        </p:nvGraphicFramePr>
+        <p:xfrm>
+          <a:off x="3003550" y="2716272"/>
+          <a:ext cx="6642099" cy="768690"/>
+        </p:xfrm>
+        <a:graphic>
+          <a:graphicData uri="http://schemas.openxmlformats.org/drawingml/2006/table">
+            <a:tbl>
+              <a:tblPr>
+                <a:tableStyleId>{5C22544A-7EE6-4342-B048-85BDC9FD1C3A}</a:tableStyleId>
+              </a:tblPr>
+              <a:tblGrid>
+                <a:gridCol w="2214033"/>
+                <a:gridCol w="2214033"/>
+                <a:gridCol w="2214033"/>
+              </a:tblGrid>
+              <a:tr h="768690">
+                <a:tc>
+                  <a:txBody>
+                    <a:bodyPr/>
+                    <a:lstStyle/>
+                    <a:p>
+                      <a:pPr marL="0" marR="0" algn="ctr">
+                        <a:spcBef>
+                          <a:spcPts val="900"/>
+                        </a:spcBef>
+                        <a:spcAft>
+                          <a:spcPts val="300"/>
+                        </a:spcAft>
+                      </a:pPr>
+                      <a:r>
+                        <a:rPr lang="en-US" sz="1200" dirty="0">
+                          <a:effectLst/>
+                        </a:rPr>
+                        <a:t>Matthew </a:t>
+                      </a:r>
+                      <a:r>
+                        <a:rPr lang="en-US" sz="1200" dirty="0" err="1">
+                          <a:effectLst/>
+                        </a:rPr>
+                        <a:t>Bachelder</a:t>
+                      </a:r>
+                      <a:r>
+                        <a:rPr lang="en-US" sz="900" dirty="0">
+                          <a:effectLst/>
+                        </a:rPr>
+                        <a:t/>
+                      </a:r>
+                      <a:br>
+                        <a:rPr lang="en-US" sz="900" dirty="0">
+                          <a:effectLst/>
+                        </a:rPr>
+                      </a:br>
+                      <a:r>
+                        <a:rPr lang="en-US" sz="1000" dirty="0">
+                          <a:effectLst/>
+                        </a:rPr>
+                        <a:t>University of Texas at Dallas</a:t>
+                      </a:r>
+                      <a:r>
+                        <a:rPr lang="en-US" sz="900" dirty="0">
+                          <a:effectLst/>
+                        </a:rPr>
+                        <a:t/>
+                      </a:r>
+                      <a:br>
+                        <a:rPr lang="en-US" sz="900" dirty="0">
+                          <a:effectLst/>
+                        </a:rPr>
+                      </a:br>
+                      <a:r>
+                        <a:rPr lang="en-US" sz="1000" dirty="0">
+                          <a:effectLst/>
+                        </a:rPr>
+                        <a:t>United States</a:t>
+                      </a:r>
+                      <a:r>
+                        <a:rPr lang="en-US" sz="900" dirty="0">
+                          <a:effectLst/>
+                        </a:rPr>
+                        <a:t/>
+                      </a:r>
+                      <a:br>
+                        <a:rPr lang="en-US" sz="900" dirty="0">
+                          <a:effectLst/>
+                        </a:rPr>
+                      </a:br>
+                      <a:r>
+                        <a:rPr lang="en-US" sz="1000" dirty="0">
+                          <a:effectLst/>
+                        </a:rPr>
+                        <a:t>mtb140130@utdallas.edu</a:t>
+                      </a:r>
+                      <a:endParaRPr lang="en-US" sz="900" dirty="0">
+                        <a:effectLst/>
+                        <a:latin typeface="Linux Libertine" charset="0"/>
+                        <a:ea typeface="Calibri" charset="0"/>
+                        <a:cs typeface="Times New Roman" charset="0"/>
+                      </a:endParaRPr>
+                    </a:p>
+                  </a:txBody>
+                  <a:tcPr marL="68580" marR="68580" marT="0" marB="0"/>
+                </a:tc>
+                <a:tc>
+                  <a:txBody>
+                    <a:bodyPr/>
+                    <a:lstStyle/>
+                    <a:p>
+                      <a:pPr marL="0" marR="0" algn="ctr">
+                        <a:spcBef>
+                          <a:spcPts val="900"/>
+                        </a:spcBef>
+                        <a:spcAft>
+                          <a:spcPts val="300"/>
+                        </a:spcAft>
+                      </a:pPr>
+                      <a:r>
+                        <a:rPr lang="en-US" sz="1200">
+                          <a:effectLst/>
+                        </a:rPr>
+                        <a:t>Vaishnavi Bhosale</a:t>
+                      </a:r>
+                      <a:r>
+                        <a:rPr lang="en-US" sz="900">
+                          <a:effectLst/>
+                        </a:rPr>
+                        <a:t/>
+                      </a:r>
+                      <a:br>
+                        <a:rPr lang="en-US" sz="900">
+                          <a:effectLst/>
+                        </a:rPr>
+                      </a:br>
+                      <a:r>
+                        <a:rPr lang="en-US" sz="1000">
+                          <a:effectLst/>
+                        </a:rPr>
+                        <a:t>University of Texas at Dallas</a:t>
+                      </a:r>
+                      <a:r>
+                        <a:rPr lang="en-US" sz="900">
+                          <a:effectLst/>
+                        </a:rPr>
+                        <a:t/>
+                      </a:r>
+                      <a:br>
+                        <a:rPr lang="en-US" sz="900">
+                          <a:effectLst/>
+                        </a:rPr>
+                      </a:br>
+                      <a:r>
+                        <a:rPr lang="en-US" sz="1000">
+                          <a:effectLst/>
+                        </a:rPr>
+                        <a:t>United States</a:t>
+                      </a:r>
+                      <a:r>
+                        <a:rPr lang="en-US" sz="900">
+                          <a:effectLst/>
+                        </a:rPr>
+                        <a:t/>
+                      </a:r>
+                      <a:br>
+                        <a:rPr lang="en-US" sz="900">
+                          <a:effectLst/>
+                        </a:rPr>
+                      </a:br>
+                      <a:r>
+                        <a:rPr lang="en-US" sz="1000">
+                          <a:effectLst/>
+                        </a:rPr>
+                        <a:t>vbb160030@utdallas.edu</a:t>
+                      </a:r>
+                      <a:endParaRPr lang="en-US" sz="900">
+                        <a:effectLst/>
+                        <a:latin typeface="Linux Libertine" charset="0"/>
+                        <a:ea typeface="Calibri" charset="0"/>
+                        <a:cs typeface="Times New Roman" charset="0"/>
+                      </a:endParaRPr>
+                    </a:p>
+                  </a:txBody>
+                  <a:tcPr marL="68580" marR="68580" marT="0" marB="0"/>
+                </a:tc>
+                <a:tc>
+                  <a:txBody>
+                    <a:bodyPr/>
+                    <a:lstStyle/>
+                    <a:p>
+                      <a:pPr marL="0" marR="0" algn="ctr">
+                        <a:spcBef>
+                          <a:spcPts val="900"/>
+                        </a:spcBef>
+                        <a:spcAft>
+                          <a:spcPts val="300"/>
+                        </a:spcAft>
+                      </a:pPr>
+                      <a:r>
+                        <a:rPr lang="en-US" sz="1200" dirty="0">
+                          <a:effectLst/>
+                        </a:rPr>
+                        <a:t>Richard Fisher</a:t>
+                      </a:r>
+                      <a:r>
+                        <a:rPr lang="en-US" sz="900" dirty="0">
+                          <a:effectLst/>
+                        </a:rPr>
+                        <a:t/>
+                      </a:r>
+                      <a:br>
+                        <a:rPr lang="en-US" sz="900" dirty="0">
+                          <a:effectLst/>
+                        </a:rPr>
+                      </a:br>
+                      <a:r>
+                        <a:rPr lang="en-US" sz="1000" dirty="0">
+                          <a:effectLst/>
+                        </a:rPr>
+                        <a:t>University of Texas at Dallas</a:t>
+                      </a:r>
+                      <a:r>
+                        <a:rPr lang="en-US" sz="900" dirty="0">
+                          <a:effectLst/>
+                        </a:rPr>
+                        <a:t/>
+                      </a:r>
+                      <a:br>
+                        <a:rPr lang="en-US" sz="900" dirty="0">
+                          <a:effectLst/>
+                        </a:rPr>
+                      </a:br>
+                      <a:r>
+                        <a:rPr lang="en-US" sz="1000" dirty="0">
+                          <a:effectLst/>
+                        </a:rPr>
+                        <a:t>United States</a:t>
+                      </a:r>
+                      <a:r>
+                        <a:rPr lang="en-US" sz="900" dirty="0">
+                          <a:effectLst/>
+                        </a:rPr>
+                        <a:t/>
+                      </a:r>
+                      <a:br>
+                        <a:rPr lang="en-US" sz="900" dirty="0">
+                          <a:effectLst/>
+                        </a:rPr>
+                      </a:br>
+                      <a:r>
+                        <a:rPr lang="en-US" sz="1000" dirty="0">
+                          <a:effectLst/>
+                        </a:rPr>
+                        <a:t>rxf120030@utdallas.edu</a:t>
+                      </a:r>
+                      <a:endParaRPr lang="en-US" sz="900" dirty="0">
+                        <a:effectLst/>
+                        <a:latin typeface="Linux Libertine" charset="0"/>
+                        <a:ea typeface="Calibri" charset="0"/>
+                        <a:cs typeface="Times New Roman" charset="0"/>
+                      </a:endParaRPr>
+                    </a:p>
+                  </a:txBody>
+                  <a:tcPr marL="68580" marR="68580" marT="0" marB="0"/>
+                </a:tc>
+              </a:tr>
+            </a:tbl>
+          </a:graphicData>
+        </a:graphic>
+      </p:graphicFrame>
+      <p:sp>
+        <p:nvSpPr>
+          <p:cNvPr id="5" name="Rectangle 1"/>
+          <p:cNvSpPr>
+            <a:spLocks noGrp="1" noChangeArrowheads="1"/>
           </p:cNvSpPr>
           <p:nvPr>
             <p:ph type="ctrTitle"/>
           </p:nvPr>
         </p:nvSpPr>
-        <p:spPr/>
-        <p:txBody>
-          <a:bodyPr/>
-          <a:lstStyle/>
-          <a:p>
-            <a:endParaRPr lang="en-US"/>
-          </a:p>
-        </p:txBody>
-      </p:sp>
-      <p:sp>
-        <p:nvSpPr>
-          <p:cNvPr id="3" name="Subtitle 2"/>
-          <p:cNvSpPr>
-            <a:spLocks noGrp="1"/>
-          </p:cNvSpPr>
-          <p:nvPr>
-            <p:ph type="subTitle" idx="1"/>
-          </p:nvPr>
-        </p:nvSpPr>
-        <p:spPr/>
-        <p:txBody>
-          <a:bodyPr/>
-          <a:lstStyle/>
-          <a:p>
-            <a:endParaRPr lang="en-US"/>
+        <p:spPr bwMode="auto">
+          <a:xfrm>
+            <a:off x="3423665" y="1916053"/>
+            <a:ext cx="5344668" cy="800219"/>
+          </a:xfrm>
+          <a:prstGeom prst="rect">
+            <a:avLst/>
+          </a:prstGeom>
+          <a:noFill/>
+          <a:ln>
+            <a:noFill/>
+          </a:ln>
+          <a:effectLst/>
+          <a:extLst>
+            <a:ext uri="{909E8E84-426E-40DD-AFC4-6F175D3DCCD1}">
+              <a14:hiddenFill xmlns:a14="http://schemas.microsoft.com/office/drawing/2010/main">
+                <a:solidFill>
+                  <a:schemeClr val="accent1"/>
+                </a:solidFill>
+              </a14:hiddenFill>
+            </a:ext>
+            <a:ext uri="{91240B29-F687-4F45-9708-019B960494DF}">
+              <a14:hiddenLine xmlns:a14="http://schemas.microsoft.com/office/drawing/2010/main" w="9525">
+                <a:solidFill>
+                  <a:schemeClr val="tx1"/>
+                </a:solidFill>
+                <a:miter lim="800000"/>
+                <a:headEnd/>
+                <a:tailEnd/>
+              </a14:hiddenLine>
+            </a:ext>
+            <a:ext uri="{AF507438-7753-43E0-B8FC-AC1667EBCBE1}">
+              <a14:hiddenEffects xmlns:a14="http://schemas.microsoft.com/office/drawing/2010/main">
+                <a:effectLst>
+                  <a:outerShdw blurRad="63500" dist="38099" dir="2700000" algn="ctr" rotWithShape="0">
+                    <a:schemeClr val="bg2">
+                      <a:alpha val="74998"/>
+                    </a:schemeClr>
+                  </a:outerShdw>
+                </a:effectLst>
+              </a14:hiddenEffects>
+            </a:ext>
+          </a:extLst>
+        </p:spPr>
+        <p:txBody>
+          <a:bodyPr vert="horz" wrap="none" lIns="91440" tIns="45720" rIns="91440" bIns="45720" numCol="1" anchor="ctr" anchorCtr="0" compatLnSpc="1">
+            <a:prstTxWarp prst="textNoShape">
+              <a:avLst/>
+            </a:prstTxWarp>
+            <a:spAutoFit/>
+          </a:bodyPr>
+          <a:lstStyle/>
+          <a:p>
+            <a:pPr marL="0" marR="0" lvl="0" indent="0" defTabSz="914400" rtl="0" eaLnBrk="0" fontAlgn="base" latinLnBrk="0" hangingPunct="0">
+              <a:lnSpc>
+                <a:spcPct val="100000"/>
+              </a:lnSpc>
+              <a:spcBef>
+                <a:spcPct val="0"/>
+              </a:spcBef>
+              <a:spcAft>
+                <a:spcPct val="0"/>
+              </a:spcAft>
+              <a:buClrTx/>
+              <a:buSzTx/>
+              <a:buFontTx/>
+              <a:buNone/>
+              <a:tabLst/>
+            </a:pPr>
+            <a:r>
+              <a:rPr kumimoji="0" lang="en-US" altLang="en-US" sz="2800" b="0" i="0" u="none" strike="noStrike" cap="none" normalizeH="0" baseline="0" dirty="0">
+                <a:ln>
+                  <a:noFill/>
+                </a:ln>
+                <a:solidFill>
+                  <a:schemeClr val="tx1"/>
+                </a:solidFill>
+                <a:effectLst/>
+                <a:latin typeface="Arial" charset="0"/>
+              </a:rPr>
+              <a:t>PIT Mutation Tool Additions</a:t>
+            </a:r>
+          </a:p>
+          <a:p>
+            <a:pPr marL="0" marR="0" lvl="0" indent="0" algn="l" defTabSz="914400" rtl="0" eaLnBrk="0" fontAlgn="base" latinLnBrk="0" hangingPunct="0">
+              <a:lnSpc>
+                <a:spcPct val="100000"/>
+              </a:lnSpc>
+              <a:spcBef>
+                <a:spcPct val="0"/>
+              </a:spcBef>
+              <a:spcAft>
+                <a:spcPct val="0"/>
+              </a:spcAft>
+              <a:buClrTx/>
+              <a:buSzTx/>
+              <a:buFontTx/>
+              <a:buNone/>
+              <a:tabLst/>
+            </a:pPr>
+            <a:endParaRPr kumimoji="0" lang="en-US" altLang="en-US" sz="1800" b="0" i="0" u="none" strike="noStrike" cap="none" normalizeH="0" baseline="0" dirty="0">
+              <a:ln>
+                <a:noFill/>
+              </a:ln>
+              <a:solidFill>
+                <a:schemeClr val="tx1"/>
+              </a:solidFill>
+              <a:effectLst/>
+              <a:latin typeface="Arial" charset="0"/>
+            </a:endParaRPr>
           </a:p>
         </p:txBody>
       </p:sp>
@@ -3006,6 +3374,195 @@
     <p:extLst>
       <p:ext uri="{BB962C8B-B14F-4D97-AF65-F5344CB8AC3E}">
         <p14:creationId xmlns:p14="http://schemas.microsoft.com/office/powerpoint/2010/main" val="2009016324"/>
+      </p:ext>
+    </p:extLst>
+  </p:cSld>
+  <p:clrMapOvr>
+    <a:masterClrMapping/>
+  </p:clrMapOvr>
+</p:sld>
+</file>
+
+<file path=ppt/slides/slide2.xml><?xml version="1.0" encoding="utf-8"?>
+<p:sld xmlns:a="http://schemas.openxmlformats.org/drawingml/2006/main" xmlns:r="http://schemas.openxmlformats.org/officeDocument/2006/relationships" xmlns:p="http://schemas.openxmlformats.org/presentationml/2006/main">
+  <p:cSld>
+    <p:spTree>
+      <p:nvGrpSpPr>
+        <p:cNvPr id="1" name=""/>
+        <p:cNvGrpSpPr/>
+        <p:nvPr/>
+      </p:nvGrpSpPr>
+      <p:grpSpPr>
+        <a:xfrm>
+          <a:off x="0" y="0"/>
+          <a:ext cx="0" cy="0"/>
+          <a:chOff x="0" y="0"/>
+          <a:chExt cx="0" cy="0"/>
+        </a:xfrm>
+      </p:grpSpPr>
+      <p:sp>
+        <p:nvSpPr>
+          <p:cNvPr id="2" name="Title 1"/>
+          <p:cNvSpPr>
+            <a:spLocks noGrp="1"/>
+          </p:cNvSpPr>
+          <p:nvPr>
+            <p:ph type="title"/>
+          </p:nvPr>
+        </p:nvSpPr>
+        <p:spPr/>
+        <p:txBody>
+          <a:bodyPr/>
+          <a:lstStyle/>
+          <a:p>
+            <a:r>
+              <a:rPr lang="en-US" dirty="0" smtClean="0"/>
+              <a:t>What is mutation testing?</a:t>
+            </a:r>
+            <a:endParaRPr lang="en-US" dirty="0"/>
+          </a:p>
+        </p:txBody>
+      </p:sp>
+      <p:sp>
+        <p:nvSpPr>
+          <p:cNvPr id="3" name="Content Placeholder 2"/>
+          <p:cNvSpPr>
+            <a:spLocks noGrp="1"/>
+          </p:cNvSpPr>
+          <p:nvPr>
+            <p:ph idx="1"/>
+          </p:nvPr>
+        </p:nvSpPr>
+        <p:spPr/>
+        <p:txBody>
+          <a:bodyPr/>
+          <a:lstStyle/>
+          <a:p>
+            <a:r>
+              <a:rPr lang="en-US" dirty="0"/>
+              <a:t>A</a:t>
+            </a:r>
+            <a:r>
+              <a:rPr lang="en-US" dirty="0" smtClean="0"/>
+              <a:t> </a:t>
+            </a:r>
+            <a:r>
+              <a:rPr lang="en-US" dirty="0"/>
+              <a:t>method of software quality control that tests the unit test suite defined for programs by artificially injecting errors, or mutations, into software.  </a:t>
+            </a:r>
+            <a:endParaRPr lang="en-US" dirty="0" smtClean="0"/>
+          </a:p>
+          <a:p>
+            <a:r>
+              <a:rPr lang="en-US" dirty="0" smtClean="0"/>
+              <a:t>Tests </a:t>
+            </a:r>
+            <a:r>
+              <a:rPr lang="en-US" dirty="0"/>
+              <a:t>are then executed to evaluate the quality of the test suite. </a:t>
+            </a:r>
+            <a:endParaRPr lang="en-US" dirty="0" smtClean="0"/>
+          </a:p>
+          <a:p>
+            <a:pPr lvl="1"/>
+            <a:r>
+              <a:rPr lang="en-US" dirty="0" smtClean="0"/>
+              <a:t> </a:t>
+            </a:r>
+            <a:r>
+              <a:rPr lang="en-US" dirty="0"/>
+              <a:t>If the mutations are detected, then the mutation is killed and the test suite is deemed adequate with respect to that section of code.  </a:t>
+            </a:r>
+            <a:endParaRPr lang="en-US" dirty="0" smtClean="0"/>
+          </a:p>
+          <a:p>
+            <a:pPr lvl="1"/>
+            <a:r>
+              <a:rPr lang="en-US" dirty="0" smtClean="0"/>
+              <a:t>If </a:t>
+            </a:r>
+            <a:r>
+              <a:rPr lang="en-US" dirty="0"/>
+              <a:t>the mutation is not detected, then it is said to have passed, and the test suite for that section of code is inadequate. </a:t>
+            </a:r>
+          </a:p>
+          <a:p>
+            <a:endParaRPr lang="en-US" dirty="0"/>
+          </a:p>
+        </p:txBody>
+      </p:sp>
+    </p:spTree>
+    <p:extLst>
+      <p:ext uri="{BB962C8B-B14F-4D97-AF65-F5344CB8AC3E}">
+        <p14:creationId xmlns:p14="http://schemas.microsoft.com/office/powerpoint/2010/main" val="21460026"/>
+      </p:ext>
+    </p:extLst>
+  </p:cSld>
+  <p:clrMapOvr>
+    <a:masterClrMapping/>
+  </p:clrMapOvr>
+</p:sld>
+</file>
+
+<file path=ppt/slides/slide3.xml><?xml version="1.0" encoding="utf-8"?>
+<p:sld xmlns:a="http://schemas.openxmlformats.org/drawingml/2006/main" xmlns:r="http://schemas.openxmlformats.org/officeDocument/2006/relationships" xmlns:p="http://schemas.openxmlformats.org/presentationml/2006/main">
+  <p:cSld>
+    <p:spTree>
+      <p:nvGrpSpPr>
+        <p:cNvPr id="1" name=""/>
+        <p:cNvGrpSpPr/>
+        <p:nvPr/>
+      </p:nvGrpSpPr>
+      <p:grpSpPr>
+        <a:xfrm>
+          <a:off x="0" y="0"/>
+          <a:ext cx="0" cy="0"/>
+          <a:chOff x="0" y="0"/>
+          <a:chExt cx="0" cy="0"/>
+        </a:xfrm>
+      </p:grpSpPr>
+      <p:sp>
+        <p:nvSpPr>
+          <p:cNvPr id="2" name="Title 1"/>
+          <p:cNvSpPr>
+            <a:spLocks noGrp="1"/>
+          </p:cNvSpPr>
+          <p:nvPr>
+            <p:ph type="title"/>
+          </p:nvPr>
+        </p:nvSpPr>
+        <p:spPr/>
+        <p:txBody>
+          <a:bodyPr/>
+          <a:lstStyle/>
+          <a:p>
+            <a:endParaRPr lang="en-US"/>
+          </a:p>
+        </p:txBody>
+      </p:sp>
+      <p:sp>
+        <p:nvSpPr>
+          <p:cNvPr id="3" name="Content Placeholder 2"/>
+          <p:cNvSpPr>
+            <a:spLocks noGrp="1"/>
+          </p:cNvSpPr>
+          <p:nvPr>
+            <p:ph idx="1"/>
+          </p:nvPr>
+        </p:nvSpPr>
+        <p:spPr/>
+        <p:txBody>
+          <a:bodyPr/>
+          <a:lstStyle/>
+          <a:p>
+            <a:endParaRPr lang="en-US"/>
+          </a:p>
+        </p:txBody>
+      </p:sp>
+    </p:spTree>
+    <p:extLst>
+      <p:ext uri="{BB962C8B-B14F-4D97-AF65-F5344CB8AC3E}">
+        <p14:creationId xmlns:p14="http://schemas.microsoft.com/office/powerpoint/2010/main" val="1028736871"/>
       </p:ext>
     </p:extLst>
   </p:cSld>

</xml_diff>

<commit_message>
Add proposed addition slide
</commit_message>
<xml_diff>
--- a/Midterm_Presentation.pptx
+++ b/Midterm_Presentation.pptx
@@ -3536,7 +3536,17 @@
           <a:bodyPr/>
           <a:lstStyle/>
           <a:p>
-            <a:endParaRPr lang="en-US"/>
+            <a:r>
+              <a:rPr lang="en-US" dirty="0"/>
+              <a:t>Proposed Additions to PIT</a:t>
+            </a:r>
+            <a:r>
+              <a:rPr lang="en-US" dirty="0" smtClean="0">
+                <a:effectLst/>
+              </a:rPr>
+              <a:t> </a:t>
+            </a:r>
+            <a:endParaRPr lang="en-US" dirty="0"/>
           </a:p>
         </p:txBody>
       </p:sp>
@@ -3552,10 +3562,144 @@
         </p:nvSpPr>
         <p:spPr/>
         <p:txBody>
-          <a:bodyPr/>
-          <a:lstStyle/>
-          <a:p>
-            <a:endParaRPr lang="en-US"/>
+          <a:bodyPr>
+            <a:normAutofit fontScale="70000" lnSpcReduction="20000"/>
+          </a:bodyPr>
+          <a:lstStyle/>
+          <a:p>
+            <a:r>
+              <a:rPr lang="en-US" dirty="0" smtClean="0"/>
+              <a:t>ABS</a:t>
+            </a:r>
+          </a:p>
+          <a:p>
+            <a:pPr lvl="1"/>
+            <a:r>
+              <a:rPr lang="en-US" dirty="0" smtClean="0"/>
+              <a:t>Replaces </a:t>
+            </a:r>
+            <a:r>
+              <a:rPr lang="en-US" dirty="0"/>
+              <a:t>a variable by its negation, e.g., a becomes –a</a:t>
+            </a:r>
+          </a:p>
+          <a:p>
+            <a:r>
+              <a:rPr lang="en-US" dirty="0" smtClean="0"/>
+              <a:t>OBBN </a:t>
+            </a:r>
+          </a:p>
+          <a:p>
+            <a:pPr lvl="1"/>
+            <a:r>
+              <a:rPr lang="en-US" dirty="0" smtClean="0"/>
+              <a:t>Replaces </a:t>
+            </a:r>
+            <a:r>
+              <a:rPr lang="en-US" dirty="0"/>
+              <a:t>the operators &amp; by | and vice versa, e.g., </a:t>
+            </a:r>
+            <a:r>
+              <a:rPr lang="en-US" dirty="0" err="1"/>
+              <a:t>a&amp;b</a:t>
+            </a:r>
+            <a:r>
+              <a:rPr lang="en-US" dirty="0"/>
+              <a:t> becomes </a:t>
+            </a:r>
+            <a:r>
+              <a:rPr lang="en-US" dirty="0" err="1"/>
+              <a:t>a|b</a:t>
+            </a:r>
+            <a:endParaRPr lang="en-US" dirty="0"/>
+          </a:p>
+          <a:p>
+            <a:r>
+              <a:rPr lang="en-US" dirty="0" smtClean="0"/>
+              <a:t>AOD </a:t>
+            </a:r>
+          </a:p>
+          <a:p>
+            <a:pPr lvl="1"/>
+            <a:r>
+              <a:rPr lang="en-US" dirty="0" smtClean="0"/>
+              <a:t>Replaces </a:t>
+            </a:r>
+            <a:r>
+              <a:rPr lang="en-US" dirty="0"/>
+              <a:t>an arithmetic expression by one of the operand, e.g., a + b becomes a</a:t>
+            </a:r>
+          </a:p>
+          <a:p>
+            <a:r>
+              <a:rPr lang="en-US" dirty="0" smtClean="0"/>
+              <a:t>ROR</a:t>
+            </a:r>
+          </a:p>
+          <a:p>
+            <a:pPr lvl="1"/>
+            <a:r>
+              <a:rPr lang="en-US" dirty="0" smtClean="0"/>
+              <a:t>Replaces </a:t>
+            </a:r>
+            <a:r>
+              <a:rPr lang="en-US" dirty="0"/>
+              <a:t>the relational operators with another one. It applies every replacement, e.g., &lt; becomes ≥, or &gt; becomes ≤</a:t>
+            </a:r>
+          </a:p>
+          <a:p>
+            <a:r>
+              <a:rPr lang="en-US" dirty="0" smtClean="0"/>
+              <a:t>AOR</a:t>
+            </a:r>
+          </a:p>
+          <a:p>
+            <a:pPr lvl="1"/>
+            <a:r>
+              <a:rPr lang="en-US" dirty="0" smtClean="0"/>
+              <a:t>Replaces </a:t>
+            </a:r>
+            <a:r>
+              <a:rPr lang="en-US" dirty="0"/>
+              <a:t>an arithmetic expression by another one. a + b becomes a ∗ b</a:t>
+            </a:r>
+          </a:p>
+          <a:p>
+            <a:r>
+              <a:rPr lang="en-US" dirty="0" smtClean="0"/>
+              <a:t>UOI</a:t>
+            </a:r>
+          </a:p>
+          <a:p>
+            <a:pPr lvl="1"/>
+            <a:r>
+              <a:rPr lang="en-US" dirty="0" smtClean="0"/>
+              <a:t>Replaces </a:t>
+            </a:r>
+            <a:r>
+              <a:rPr lang="en-US" dirty="0"/>
+              <a:t>a variable with a unary operator or removes an instance of an unary operator. a becomes a++</a:t>
+            </a:r>
+          </a:p>
+          <a:p>
+            <a:r>
+              <a:rPr lang="en-US" dirty="0" smtClean="0"/>
+              <a:t>CRCR</a:t>
+            </a:r>
+          </a:p>
+          <a:p>
+            <a:pPr lvl="1"/>
+            <a:r>
+              <a:rPr lang="en-US" dirty="0" smtClean="0"/>
+              <a:t>Replaces </a:t>
+            </a:r>
+            <a:r>
+              <a:rPr lang="en-US" dirty="0"/>
+              <a:t>a constant a with its negation, or with 1, 0, a + 1, a – 1, e.g., a becomes −a, and a becomes a − 1.</a:t>
+            </a:r>
+          </a:p>
+          <a:p>
+            <a:endParaRPr lang="en-US" dirty="0"/>
           </a:p>
         </p:txBody>
       </p:sp>

</xml_diff>

<commit_message>
Add Experimental Evaluation slide
</commit_message>
<xml_diff>
--- a/Midterm_Presentation.pptx
+++ b/Midterm_Presentation.pptx
@@ -8,6 +8,7 @@
     <p:sldId id="256" r:id="rId2"/>
     <p:sldId id="257" r:id="rId3"/>
     <p:sldId id="258" r:id="rId4"/>
+    <p:sldId id="259" r:id="rId5"/>
   </p:sldIdLst>
   <p:sldSz cx="12192000" cy="6858000"/>
   <p:notesSz cx="6858000" cy="9144000"/>
@@ -3716,6 +3717,201 @@
 </p:sld>
 </file>
 
+<file path=ppt/slides/slide4.xml><?xml version="1.0" encoding="utf-8"?>
+<p:sld xmlns:a="http://schemas.openxmlformats.org/drawingml/2006/main" xmlns:r="http://schemas.openxmlformats.org/officeDocument/2006/relationships" xmlns:p="http://schemas.openxmlformats.org/presentationml/2006/main">
+  <p:cSld>
+    <p:spTree>
+      <p:nvGrpSpPr>
+        <p:cNvPr id="1" name=""/>
+        <p:cNvGrpSpPr/>
+        <p:nvPr/>
+      </p:nvGrpSpPr>
+      <p:grpSpPr>
+        <a:xfrm>
+          <a:off x="0" y="0"/>
+          <a:ext cx="0" cy="0"/>
+          <a:chOff x="0" y="0"/>
+          <a:chExt cx="0" cy="0"/>
+        </a:xfrm>
+      </p:grpSpPr>
+      <p:sp>
+        <p:nvSpPr>
+          <p:cNvPr id="2" name="Title 1"/>
+          <p:cNvSpPr>
+            <a:spLocks noGrp="1"/>
+          </p:cNvSpPr>
+          <p:nvPr>
+            <p:ph type="title"/>
+          </p:nvPr>
+        </p:nvSpPr>
+        <p:spPr/>
+        <p:txBody>
+          <a:bodyPr/>
+          <a:lstStyle/>
+          <a:p>
+            <a:r>
+              <a:rPr lang="en-US" dirty="0"/>
+              <a:t>Experimental Evaluation </a:t>
+            </a:r>
+          </a:p>
+        </p:txBody>
+      </p:sp>
+      <p:sp>
+        <p:nvSpPr>
+          <p:cNvPr id="3" name="Content Placeholder 2"/>
+          <p:cNvSpPr>
+            <a:spLocks noGrp="1"/>
+          </p:cNvSpPr>
+          <p:nvPr>
+            <p:ph idx="1"/>
+          </p:nvPr>
+        </p:nvSpPr>
+        <p:spPr/>
+        <p:txBody>
+          <a:bodyPr>
+            <a:normAutofit/>
+          </a:bodyPr>
+          <a:lstStyle/>
+          <a:p>
+            <a:r>
+              <a:rPr lang="en-US" dirty="0" smtClean="0"/>
+              <a:t>Evaluated </a:t>
+            </a:r>
+            <a:r>
+              <a:rPr lang="en-US" dirty="0"/>
+              <a:t>on five real world projects chosen from GitHub. </a:t>
+            </a:r>
+            <a:endParaRPr lang="en-US" dirty="0" smtClean="0"/>
+          </a:p>
+          <a:p>
+            <a:pPr lvl="1"/>
+            <a:r>
+              <a:rPr lang="en-US" dirty="0" smtClean="0"/>
+              <a:t>Each </a:t>
+            </a:r>
+            <a:r>
+              <a:rPr lang="en-US" dirty="0"/>
+              <a:t>project will contain a minimum of 1,000 lines of code, and will be evaluated after running at least 50 tests per </a:t>
+            </a:r>
+            <a:r>
+              <a:rPr lang="en-US" dirty="0" smtClean="0"/>
+              <a:t>project</a:t>
+            </a:r>
+          </a:p>
+          <a:p>
+            <a:r>
+              <a:rPr lang="en-US" dirty="0" smtClean="0"/>
+              <a:t>Overall </a:t>
+            </a:r>
+            <a:r>
+              <a:rPr lang="en-US" dirty="0"/>
+              <a:t>quality of the test </a:t>
+            </a:r>
+            <a:r>
+              <a:rPr lang="en-US" dirty="0" smtClean="0"/>
+              <a:t>suites will </a:t>
+            </a:r>
+            <a:r>
+              <a:rPr lang="en-US" dirty="0"/>
+              <a:t>be measured using the mutation adequacy score given in equation </a:t>
+            </a:r>
+            <a:r>
+              <a:rPr lang="en-US" dirty="0" smtClean="0">
+                <a:effectLst/>
+              </a:rPr>
+              <a:t> </a:t>
+            </a:r>
+          </a:p>
+          <a:p>
+            <a:endParaRPr lang="en-US" dirty="0"/>
+          </a:p>
+          <a:p>
+            <a:pPr lvl="1"/>
+            <a:endParaRPr lang="en-US" dirty="0" smtClean="0"/>
+          </a:p>
+          <a:p>
+            <a:pPr lvl="1"/>
+            <a:endParaRPr lang="en-US" dirty="0"/>
+          </a:p>
+          <a:p>
+            <a:pPr lvl="1"/>
+            <a:r>
+              <a:rPr lang="en-US" dirty="0" smtClean="0"/>
+              <a:t>Where</a:t>
+            </a:r>
+            <a:r>
+              <a:rPr lang="en-US" dirty="0"/>
+              <a:t> </a:t>
+            </a:r>
+            <a:r>
+              <a:rPr lang="en-US" dirty="0" smtClean="0"/>
+              <a:t> number of </a:t>
+            </a:r>
+            <a:r>
+              <a:rPr lang="en-US" dirty="0"/>
+              <a:t>Killed mutants, M = total number of Mutants, </a:t>
+            </a:r>
+            <a:r>
+              <a:rPr lang="en-US" dirty="0" err="1"/>
+              <a:t>En</a:t>
+            </a:r>
+            <a:r>
+              <a:rPr lang="en-US" dirty="0"/>
+              <a:t> = </a:t>
+            </a:r>
+            <a:r>
+              <a:rPr lang="en-US" dirty="0" smtClean="0"/>
+              <a:t>number of </a:t>
+            </a:r>
+            <a:r>
+              <a:rPr lang="en-US" dirty="0"/>
+              <a:t>equivalent mutants</a:t>
+            </a:r>
+            <a:r>
+              <a:rPr lang="en-US" dirty="0" smtClean="0">
+                <a:effectLst/>
+              </a:rPr>
+              <a:t> </a:t>
+            </a:r>
+            <a:endParaRPr lang="en-US" dirty="0"/>
+          </a:p>
+        </p:txBody>
+      </p:sp>
+      <p:pic>
+        <p:nvPicPr>
+          <p:cNvPr id="4" name="Picture 3"/>
+          <p:cNvPicPr/>
+          <p:nvPr/>
+        </p:nvPicPr>
+        <p:blipFill>
+          <a:blip r:embed="rId2"/>
+          <a:stretch>
+            <a:fillRect/>
+          </a:stretch>
+        </p:blipFill>
+        <p:spPr>
+          <a:xfrm>
+            <a:off x="2198912" y="3865698"/>
+            <a:ext cx="5878287" cy="1228816"/>
+          </a:xfrm>
+          <a:prstGeom prst="rect">
+            <a:avLst/>
+          </a:prstGeom>
+        </p:spPr>
+      </p:pic>
+    </p:spTree>
+    <p:extLst>
+      <p:ext uri="{BB962C8B-B14F-4D97-AF65-F5344CB8AC3E}">
+        <p14:creationId xmlns:p14="http://schemas.microsoft.com/office/powerpoint/2010/main" val="1685585376"/>
+      </p:ext>
+    </p:extLst>
+  </p:cSld>
+  <p:clrMapOvr>
+    <a:masterClrMapping/>
+  </p:clrMapOvr>
+</p:sld>
+</file>
+
 <file path=ppt/theme/theme1.xml><?xml version="1.0" encoding="utf-8"?>
 <a:theme xmlns:a="http://schemas.openxmlformats.org/drawingml/2006/main" name="Office Theme">
   <a:themeElements>

</xml_diff>